<commit_message>
checked and updated first set of slides
</commit_message>
<xml_diff>
--- a/doc/slides/day1/session1/NGSplatforms.pptx
+++ b/doc/slides/day1/session1/NGSplatforms.pptx
@@ -1,6 +1,6 @@
 
 <file path=ppt/presentation.xml><?xml version="1.0" encoding="utf-8"?>
-<p:presentation xmlns:a="http://schemas.openxmlformats.org/drawingml/2006/main" xmlns:r="http://schemas.openxmlformats.org/officeDocument/2006/relationships" xmlns:mc="http://schemas.openxmlformats.org/markup-compatibility/2006" xmlns:mv="urn:schemas-microsoft-com:mac:vml" xmlns:p="http://schemas.openxmlformats.org/presentationml/2006/main" mc:Ignorable="mv" mc:PreserveAttributes="mv:*" saveSubsetFonts="1" autoCompressPictures="0">
+<p:presentation xmlns:a="http://schemas.openxmlformats.org/drawingml/2006/main" xmlns:r="http://schemas.openxmlformats.org/officeDocument/2006/relationships" xmlns:p="http://schemas.openxmlformats.org/presentationml/2006/main" saveSubsetFonts="1" autoCompressPictures="0">
   <p:sldMasterIdLst>
     <p:sldMasterId id="2147483648" r:id="rId1"/>
   </p:sldMasterIdLst>
@@ -126,7 +126,7 @@
 </file>
 
 <file path=ppt/notesMasters/notesMaster1.xml><?xml version="1.0" encoding="utf-8"?>
-<p:notesMaster xmlns:a="http://schemas.openxmlformats.org/drawingml/2006/main" xmlns:r="http://schemas.openxmlformats.org/officeDocument/2006/relationships" xmlns:mc="http://schemas.openxmlformats.org/markup-compatibility/2006" xmlns:mv="urn:schemas-microsoft-com:mac:vml" xmlns:p="http://schemas.openxmlformats.org/presentationml/2006/main" mc:Ignorable="mv" mc:PreserveAttributes="mv:*">
+<p:notesMaster xmlns:a="http://schemas.openxmlformats.org/drawingml/2006/main" xmlns:r="http://schemas.openxmlformats.org/officeDocument/2006/relationships" xmlns:p="http://schemas.openxmlformats.org/presentationml/2006/main">
   <p:cSld>
     <p:bg>
       <p:bgRef idx="1001">
@@ -208,7 +208,7 @@
             <a:fld id="{8122758A-CF30-2F46-BAB7-3F3293941880}" type="datetimeFigureOut">
               <a:rPr lang="en-US" smtClean="0"/>
               <a:pPr/>
-              <a:t>9/11/12</a:t>
+              <a:t>10/17/13</a:t>
             </a:fld>
             <a:endParaRPr lang="en-US"/>
           </a:p>
@@ -370,13 +370,18 @@
             <a:fld id="{DFE9A44A-116F-B241-B584-AF6BFAAC1BBD}" type="slidenum">
               <a:rPr lang="en-US" smtClean="0"/>
               <a:pPr/>
-              <a:t>‹#›</a:t>
+              <a:t>‹nr.›</a:t>
             </a:fld>
             <a:endParaRPr lang="en-US"/>
           </a:p>
         </p:txBody>
       </p:sp>
     </p:spTree>
+    <p:extLst>
+      <p:ext uri="{BB962C8B-B14F-4D97-AF65-F5344CB8AC3E}">
+        <p14:creationId xmlns:p14="http://schemas.microsoft.com/office/powerpoint/2010/main" val="333809404"/>
+      </p:ext>
+    </p:extLst>
   </p:cSld>
   <p:clrMap bg1="lt1" tx1="dk1" bg2="lt2" tx2="dk2" accent1="accent1" accent2="accent2" accent3="accent3" accent4="accent4" accent5="accent5" accent6="accent6" hlink="hlink" folHlink="folHlink"/>
   <p:notesStyle>
@@ -475,7 +480,7 @@
 </file>
 
 <file path=ppt/notesSlides/notesSlide1.xml><?xml version="1.0" encoding="utf-8"?>
-<p:notes xmlns:a="http://schemas.openxmlformats.org/drawingml/2006/main" xmlns:r="http://schemas.openxmlformats.org/officeDocument/2006/relationships" xmlns:mc="http://schemas.openxmlformats.org/markup-compatibility/2006" xmlns:mv="urn:schemas-microsoft-com:mac:vml" xmlns:p="http://schemas.openxmlformats.org/presentationml/2006/main" mc:Ignorable="mv" mc:PreserveAttributes="mv:*">
+<p:notes xmlns:a="http://schemas.openxmlformats.org/drawingml/2006/main" xmlns:r="http://schemas.openxmlformats.org/officeDocument/2006/relationships" xmlns:p="http://schemas.openxmlformats.org/presentationml/2006/main">
   <p:cSld>
     <p:spTree>
       <p:nvGrpSpPr>
@@ -573,7 +578,7 @@
 </file>
 
 <file path=ppt/notesSlides/notesSlide2.xml><?xml version="1.0" encoding="utf-8"?>
-<p:notes xmlns:a="http://schemas.openxmlformats.org/drawingml/2006/main" xmlns:r="http://schemas.openxmlformats.org/officeDocument/2006/relationships" xmlns:mc="http://schemas.openxmlformats.org/markup-compatibility/2006" xmlns:mv="urn:schemas-microsoft-com:mac:vml" xmlns:p="http://schemas.openxmlformats.org/presentationml/2006/main" mc:Ignorable="mv" mc:PreserveAttributes="mv:*">
+<p:notes xmlns:a="http://schemas.openxmlformats.org/drawingml/2006/main" xmlns:r="http://schemas.openxmlformats.org/officeDocument/2006/relationships" xmlns:p="http://schemas.openxmlformats.org/presentationml/2006/main">
   <p:cSld>
     <p:spTree>
       <p:nvGrpSpPr>
@@ -659,7 +664,7 @@
 </file>
 
 <file path=ppt/notesSlides/notesSlide3.xml><?xml version="1.0" encoding="utf-8"?>
-<p:notes xmlns:a="http://schemas.openxmlformats.org/drawingml/2006/main" xmlns:r="http://schemas.openxmlformats.org/officeDocument/2006/relationships" xmlns:mc="http://schemas.openxmlformats.org/markup-compatibility/2006" xmlns:mv="urn:schemas-microsoft-com:mac:vml" xmlns:p="http://schemas.openxmlformats.org/presentationml/2006/main" mc:Ignorable="mv" mc:PreserveAttributes="mv:*">
+<p:notes xmlns:a="http://schemas.openxmlformats.org/drawingml/2006/main" xmlns:r="http://schemas.openxmlformats.org/officeDocument/2006/relationships" xmlns:p="http://schemas.openxmlformats.org/presentationml/2006/main">
   <p:cSld>
     <p:spTree>
       <p:nvGrpSpPr>
@@ -745,7 +750,7 @@
 </file>
 
 <file path=ppt/notesSlides/notesSlide4.xml><?xml version="1.0" encoding="utf-8"?>
-<p:notes xmlns:a="http://schemas.openxmlformats.org/drawingml/2006/main" xmlns:r="http://schemas.openxmlformats.org/officeDocument/2006/relationships" xmlns:mc="http://schemas.openxmlformats.org/markup-compatibility/2006" xmlns:mv="urn:schemas-microsoft-com:mac:vml" xmlns:p="http://schemas.openxmlformats.org/presentationml/2006/main" mc:Ignorable="mv" mc:PreserveAttributes="mv:*">
+<p:notes xmlns:a="http://schemas.openxmlformats.org/drawingml/2006/main" xmlns:r="http://schemas.openxmlformats.org/officeDocument/2006/relationships" xmlns:p="http://schemas.openxmlformats.org/presentationml/2006/main">
   <p:cSld>
     <p:spTree>
       <p:nvGrpSpPr>
@@ -831,7 +836,7 @@
 </file>
 
 <file path=ppt/notesSlides/notesSlide5.xml><?xml version="1.0" encoding="utf-8"?>
-<p:notes xmlns:a="http://schemas.openxmlformats.org/drawingml/2006/main" xmlns:r="http://schemas.openxmlformats.org/officeDocument/2006/relationships" xmlns:mc="http://schemas.openxmlformats.org/markup-compatibility/2006" xmlns:mv="urn:schemas-microsoft-com:mac:vml" xmlns:p="http://schemas.openxmlformats.org/presentationml/2006/main" mc:Ignorable="mv" mc:PreserveAttributes="mv:*">
+<p:notes xmlns:a="http://schemas.openxmlformats.org/drawingml/2006/main" xmlns:r="http://schemas.openxmlformats.org/officeDocument/2006/relationships" xmlns:p="http://schemas.openxmlformats.org/presentationml/2006/main">
   <p:cSld>
     <p:spTree>
       <p:nvGrpSpPr>
@@ -921,7 +926,7 @@
 </file>
 
 <file path=ppt/notesSlides/notesSlide6.xml><?xml version="1.0" encoding="utf-8"?>
-<p:notes xmlns:a="http://schemas.openxmlformats.org/drawingml/2006/main" xmlns:r="http://schemas.openxmlformats.org/officeDocument/2006/relationships" xmlns:mc="http://schemas.openxmlformats.org/markup-compatibility/2006" xmlns:mv="urn:schemas-microsoft-com:mac:vml" xmlns:p="http://schemas.openxmlformats.org/presentationml/2006/main" mc:Ignorable="mv" mc:PreserveAttributes="mv:*">
+<p:notes xmlns:a="http://schemas.openxmlformats.org/drawingml/2006/main" xmlns:r="http://schemas.openxmlformats.org/officeDocument/2006/relationships" xmlns:p="http://schemas.openxmlformats.org/presentationml/2006/main">
   <p:cSld>
     <p:spTree>
       <p:nvGrpSpPr>
@@ -1025,7 +1030,7 @@
 </file>
 
 <file path=ppt/slideLayouts/slideLayout1.xml><?xml version="1.0" encoding="utf-8"?>
-<p:sldLayout xmlns:a="http://schemas.openxmlformats.org/drawingml/2006/main" xmlns:r="http://schemas.openxmlformats.org/officeDocument/2006/relationships" xmlns:mc="http://schemas.openxmlformats.org/markup-compatibility/2006" xmlns:mv="urn:schemas-microsoft-com:mac:vml" xmlns:p="http://schemas.openxmlformats.org/presentationml/2006/main" mc:Ignorable="mv" mc:PreserveAttributes="mv:*" type="title" preserve="1">
+<p:sldLayout xmlns:a="http://schemas.openxmlformats.org/drawingml/2006/main" xmlns:r="http://schemas.openxmlformats.org/officeDocument/2006/relationships" xmlns:p="http://schemas.openxmlformats.org/presentationml/2006/main" type="title" preserve="1">
   <p:cSld name="Title Slide">
     <p:spTree>
       <p:nvGrpSpPr>
@@ -1206,7 +1211,7 @@
             <a:fld id="{67D5CF40-C976-E240-A51E-7C97D6991720}" type="datetimeFigureOut">
               <a:rPr lang="en-US" smtClean="0"/>
               <a:pPr/>
-              <a:t>9/11/12</a:t>
+              <a:t>10/17/13</a:t>
             </a:fld>
             <a:endParaRPr lang="en-US"/>
           </a:p>
@@ -1249,7 +1254,7 @@
             <a:fld id="{5340D4B0-54F4-9B45-85A0-38D106B0B7D4}" type="slidenum">
               <a:rPr lang="en-US" smtClean="0"/>
               <a:pPr/>
-              <a:t>‹#›</a:t>
+              <a:t>‹nr.›</a:t>
             </a:fld>
             <a:endParaRPr lang="en-US"/>
           </a:p>
@@ -1264,7 +1269,7 @@
 </file>
 
 <file path=ppt/slideLayouts/slideLayout10.xml><?xml version="1.0" encoding="utf-8"?>
-<p:sldLayout xmlns:a="http://schemas.openxmlformats.org/drawingml/2006/main" xmlns:r="http://schemas.openxmlformats.org/officeDocument/2006/relationships" xmlns:mc="http://schemas.openxmlformats.org/markup-compatibility/2006" xmlns:mv="urn:schemas-microsoft-com:mac:vml" xmlns:p="http://schemas.openxmlformats.org/presentationml/2006/main" mc:Ignorable="mv" mc:PreserveAttributes="mv:*" type="vertTx" preserve="1">
+<p:sldLayout xmlns:a="http://schemas.openxmlformats.org/drawingml/2006/main" xmlns:r="http://schemas.openxmlformats.org/officeDocument/2006/relationships" xmlns:p="http://schemas.openxmlformats.org/presentationml/2006/main" type="vertTx" preserve="1">
   <p:cSld name="Title and Vertical Text">
     <p:spTree>
       <p:nvGrpSpPr>
@@ -1373,7 +1378,7 @@
             <a:fld id="{67D5CF40-C976-E240-A51E-7C97D6991720}" type="datetimeFigureOut">
               <a:rPr lang="en-US" smtClean="0"/>
               <a:pPr/>
-              <a:t>9/11/12</a:t>
+              <a:t>10/17/13</a:t>
             </a:fld>
             <a:endParaRPr lang="en-US"/>
           </a:p>
@@ -1416,7 +1421,7 @@
             <a:fld id="{5340D4B0-54F4-9B45-85A0-38D106B0B7D4}" type="slidenum">
               <a:rPr lang="en-US" smtClean="0"/>
               <a:pPr/>
-              <a:t>‹#›</a:t>
+              <a:t>‹nr.›</a:t>
             </a:fld>
             <a:endParaRPr lang="en-US"/>
           </a:p>
@@ -1431,7 +1436,7 @@
 </file>
 
 <file path=ppt/slideLayouts/slideLayout11.xml><?xml version="1.0" encoding="utf-8"?>
-<p:sldLayout xmlns:a="http://schemas.openxmlformats.org/drawingml/2006/main" xmlns:r="http://schemas.openxmlformats.org/officeDocument/2006/relationships" xmlns:mc="http://schemas.openxmlformats.org/markup-compatibility/2006" xmlns:mv="urn:schemas-microsoft-com:mac:vml" xmlns:p="http://schemas.openxmlformats.org/presentationml/2006/main" mc:Ignorable="mv" mc:PreserveAttributes="mv:*" type="vertTitleAndTx" preserve="1">
+<p:sldLayout xmlns:a="http://schemas.openxmlformats.org/drawingml/2006/main" xmlns:r="http://schemas.openxmlformats.org/officeDocument/2006/relationships" xmlns:p="http://schemas.openxmlformats.org/presentationml/2006/main" type="vertTitleAndTx" preserve="1">
   <p:cSld name="Vertical Title and Text">
     <p:spTree>
       <p:nvGrpSpPr>
@@ -1550,7 +1555,7 @@
             <a:fld id="{67D5CF40-C976-E240-A51E-7C97D6991720}" type="datetimeFigureOut">
               <a:rPr lang="en-US" smtClean="0"/>
               <a:pPr/>
-              <a:t>9/11/12</a:t>
+              <a:t>10/17/13</a:t>
             </a:fld>
             <a:endParaRPr lang="en-US"/>
           </a:p>
@@ -1593,7 +1598,7 @@
             <a:fld id="{5340D4B0-54F4-9B45-85A0-38D106B0B7D4}" type="slidenum">
               <a:rPr lang="en-US" smtClean="0"/>
               <a:pPr/>
-              <a:t>‹#›</a:t>
+              <a:t>‹nr.›</a:t>
             </a:fld>
             <a:endParaRPr lang="en-US"/>
           </a:p>
@@ -1608,7 +1613,7 @@
 </file>
 
 <file path=ppt/slideLayouts/slideLayout2.xml><?xml version="1.0" encoding="utf-8"?>
-<p:sldLayout xmlns:a="http://schemas.openxmlformats.org/drawingml/2006/main" xmlns:r="http://schemas.openxmlformats.org/officeDocument/2006/relationships" xmlns:mc="http://schemas.openxmlformats.org/markup-compatibility/2006" xmlns:mv="urn:schemas-microsoft-com:mac:vml" xmlns:p="http://schemas.openxmlformats.org/presentationml/2006/main" mc:Ignorable="mv" mc:PreserveAttributes="mv:*" type="obj" preserve="1">
+<p:sldLayout xmlns:a="http://schemas.openxmlformats.org/drawingml/2006/main" xmlns:r="http://schemas.openxmlformats.org/officeDocument/2006/relationships" xmlns:p="http://schemas.openxmlformats.org/presentationml/2006/main" type="obj" preserve="1">
   <p:cSld name="Title and Content">
     <p:spTree>
       <p:nvGrpSpPr>
@@ -1717,7 +1722,7 @@
             <a:fld id="{67D5CF40-C976-E240-A51E-7C97D6991720}" type="datetimeFigureOut">
               <a:rPr lang="en-US" smtClean="0"/>
               <a:pPr/>
-              <a:t>9/11/12</a:t>
+              <a:t>10/17/13</a:t>
             </a:fld>
             <a:endParaRPr lang="en-US"/>
           </a:p>
@@ -1760,7 +1765,7 @@
             <a:fld id="{5340D4B0-54F4-9B45-85A0-38D106B0B7D4}" type="slidenum">
               <a:rPr lang="en-US" smtClean="0"/>
               <a:pPr/>
-              <a:t>‹#›</a:t>
+              <a:t>‹nr.›</a:t>
             </a:fld>
             <a:endParaRPr lang="en-US"/>
           </a:p>
@@ -1775,7 +1780,7 @@
 </file>
 
 <file path=ppt/slideLayouts/slideLayout3.xml><?xml version="1.0" encoding="utf-8"?>
-<p:sldLayout xmlns:a="http://schemas.openxmlformats.org/drawingml/2006/main" xmlns:r="http://schemas.openxmlformats.org/officeDocument/2006/relationships" xmlns:mc="http://schemas.openxmlformats.org/markup-compatibility/2006" xmlns:mv="urn:schemas-microsoft-com:mac:vml" xmlns:p="http://schemas.openxmlformats.org/presentationml/2006/main" mc:Ignorable="mv" mc:PreserveAttributes="mv:*" type="secHead" preserve="1">
+<p:sldLayout xmlns:a="http://schemas.openxmlformats.org/drawingml/2006/main" xmlns:r="http://schemas.openxmlformats.org/officeDocument/2006/relationships" xmlns:p="http://schemas.openxmlformats.org/presentationml/2006/main" type="secHead" preserve="1">
   <p:cSld name="Section Header">
     <p:spTree>
       <p:nvGrpSpPr>
@@ -1960,7 +1965,7 @@
             <a:fld id="{67D5CF40-C976-E240-A51E-7C97D6991720}" type="datetimeFigureOut">
               <a:rPr lang="en-US" smtClean="0"/>
               <a:pPr/>
-              <a:t>9/11/12</a:t>
+              <a:t>10/17/13</a:t>
             </a:fld>
             <a:endParaRPr lang="en-US"/>
           </a:p>
@@ -2003,7 +2008,7 @@
             <a:fld id="{5340D4B0-54F4-9B45-85A0-38D106B0B7D4}" type="slidenum">
               <a:rPr lang="en-US" smtClean="0"/>
               <a:pPr/>
-              <a:t>‹#›</a:t>
+              <a:t>‹nr.›</a:t>
             </a:fld>
             <a:endParaRPr lang="en-US"/>
           </a:p>
@@ -2018,7 +2023,7 @@
 </file>
 
 <file path=ppt/slideLayouts/slideLayout4.xml><?xml version="1.0" encoding="utf-8"?>
-<p:sldLayout xmlns:a="http://schemas.openxmlformats.org/drawingml/2006/main" xmlns:r="http://schemas.openxmlformats.org/officeDocument/2006/relationships" xmlns:mc="http://schemas.openxmlformats.org/markup-compatibility/2006" xmlns:mv="urn:schemas-microsoft-com:mac:vml" xmlns:p="http://schemas.openxmlformats.org/presentationml/2006/main" mc:Ignorable="mv" mc:PreserveAttributes="mv:*" type="twoObj" preserve="1">
+<p:sldLayout xmlns:a="http://schemas.openxmlformats.org/drawingml/2006/main" xmlns:r="http://schemas.openxmlformats.org/officeDocument/2006/relationships" xmlns:p="http://schemas.openxmlformats.org/presentationml/2006/main" type="twoObj" preserve="1">
   <p:cSld name="Two Content">
     <p:spTree>
       <p:nvGrpSpPr>
@@ -2245,7 +2250,7 @@
             <a:fld id="{67D5CF40-C976-E240-A51E-7C97D6991720}" type="datetimeFigureOut">
               <a:rPr lang="en-US" smtClean="0"/>
               <a:pPr/>
-              <a:t>9/11/12</a:t>
+              <a:t>10/17/13</a:t>
             </a:fld>
             <a:endParaRPr lang="en-US"/>
           </a:p>
@@ -2288,7 +2293,7 @@
             <a:fld id="{5340D4B0-54F4-9B45-85A0-38D106B0B7D4}" type="slidenum">
               <a:rPr lang="en-US" smtClean="0"/>
               <a:pPr/>
-              <a:t>‹#›</a:t>
+              <a:t>‹nr.›</a:t>
             </a:fld>
             <a:endParaRPr lang="en-US"/>
           </a:p>
@@ -2303,7 +2308,7 @@
 </file>
 
 <file path=ppt/slideLayouts/slideLayout5.xml><?xml version="1.0" encoding="utf-8"?>
-<p:sldLayout xmlns:a="http://schemas.openxmlformats.org/drawingml/2006/main" xmlns:r="http://schemas.openxmlformats.org/officeDocument/2006/relationships" xmlns:mc="http://schemas.openxmlformats.org/markup-compatibility/2006" xmlns:mv="urn:schemas-microsoft-com:mac:vml" xmlns:p="http://schemas.openxmlformats.org/presentationml/2006/main" mc:Ignorable="mv" mc:PreserveAttributes="mv:*" type="twoTxTwoObj" preserve="1">
+<p:sldLayout xmlns:a="http://schemas.openxmlformats.org/drawingml/2006/main" xmlns:r="http://schemas.openxmlformats.org/officeDocument/2006/relationships" xmlns:p="http://schemas.openxmlformats.org/presentationml/2006/main" type="twoTxTwoObj" preserve="1">
   <p:cSld name="Comparison">
     <p:spTree>
       <p:nvGrpSpPr>
@@ -2664,7 +2669,7 @@
             <a:fld id="{67D5CF40-C976-E240-A51E-7C97D6991720}" type="datetimeFigureOut">
               <a:rPr lang="en-US" smtClean="0"/>
               <a:pPr/>
-              <a:t>9/11/12</a:t>
+              <a:t>10/17/13</a:t>
             </a:fld>
             <a:endParaRPr lang="en-US"/>
           </a:p>
@@ -2707,7 +2712,7 @@
             <a:fld id="{5340D4B0-54F4-9B45-85A0-38D106B0B7D4}" type="slidenum">
               <a:rPr lang="en-US" smtClean="0"/>
               <a:pPr/>
-              <a:t>‹#›</a:t>
+              <a:t>‹nr.›</a:t>
             </a:fld>
             <a:endParaRPr lang="en-US"/>
           </a:p>
@@ -2722,7 +2727,7 @@
 </file>
 
 <file path=ppt/slideLayouts/slideLayout6.xml><?xml version="1.0" encoding="utf-8"?>
-<p:sldLayout xmlns:a="http://schemas.openxmlformats.org/drawingml/2006/main" xmlns:r="http://schemas.openxmlformats.org/officeDocument/2006/relationships" xmlns:mc="http://schemas.openxmlformats.org/markup-compatibility/2006" xmlns:mv="urn:schemas-microsoft-com:mac:vml" xmlns:p="http://schemas.openxmlformats.org/presentationml/2006/main" mc:Ignorable="mv" mc:PreserveAttributes="mv:*" type="titleOnly" preserve="1">
+<p:sldLayout xmlns:a="http://schemas.openxmlformats.org/drawingml/2006/main" xmlns:r="http://schemas.openxmlformats.org/officeDocument/2006/relationships" xmlns:p="http://schemas.openxmlformats.org/presentationml/2006/main" type="titleOnly" preserve="1">
   <p:cSld name="Title Only">
     <p:spTree>
       <p:nvGrpSpPr>
@@ -2779,7 +2784,7 @@
             <a:fld id="{67D5CF40-C976-E240-A51E-7C97D6991720}" type="datetimeFigureOut">
               <a:rPr lang="en-US" smtClean="0"/>
               <a:pPr/>
-              <a:t>9/11/12</a:t>
+              <a:t>10/17/13</a:t>
             </a:fld>
             <a:endParaRPr lang="en-US"/>
           </a:p>
@@ -2822,7 +2827,7 @@
             <a:fld id="{5340D4B0-54F4-9B45-85A0-38D106B0B7D4}" type="slidenum">
               <a:rPr lang="en-US" smtClean="0"/>
               <a:pPr/>
-              <a:t>‹#›</a:t>
+              <a:t>‹nr.›</a:t>
             </a:fld>
             <a:endParaRPr lang="en-US"/>
           </a:p>
@@ -2837,7 +2842,7 @@
 </file>
 
 <file path=ppt/slideLayouts/slideLayout7.xml><?xml version="1.0" encoding="utf-8"?>
-<p:sldLayout xmlns:a="http://schemas.openxmlformats.org/drawingml/2006/main" xmlns:r="http://schemas.openxmlformats.org/officeDocument/2006/relationships" xmlns:mc="http://schemas.openxmlformats.org/markup-compatibility/2006" xmlns:mv="urn:schemas-microsoft-com:mac:vml" xmlns:p="http://schemas.openxmlformats.org/presentationml/2006/main" mc:Ignorable="mv" mc:PreserveAttributes="mv:*" type="blank" preserve="1">
+<p:sldLayout xmlns:a="http://schemas.openxmlformats.org/drawingml/2006/main" xmlns:r="http://schemas.openxmlformats.org/officeDocument/2006/relationships" xmlns:p="http://schemas.openxmlformats.org/presentationml/2006/main" type="blank" preserve="1">
   <p:cSld name="Blank">
     <p:spTree>
       <p:nvGrpSpPr>
@@ -2871,7 +2876,7 @@
             <a:fld id="{67D5CF40-C976-E240-A51E-7C97D6991720}" type="datetimeFigureOut">
               <a:rPr lang="en-US" smtClean="0"/>
               <a:pPr/>
-              <a:t>9/11/12</a:t>
+              <a:t>10/17/13</a:t>
             </a:fld>
             <a:endParaRPr lang="en-US"/>
           </a:p>
@@ -2914,7 +2919,7 @@
             <a:fld id="{5340D4B0-54F4-9B45-85A0-38D106B0B7D4}" type="slidenum">
               <a:rPr lang="en-US" smtClean="0"/>
               <a:pPr/>
-              <a:t>‹#›</a:t>
+              <a:t>‹nr.›</a:t>
             </a:fld>
             <a:endParaRPr lang="en-US"/>
           </a:p>
@@ -2929,7 +2934,7 @@
 </file>
 
 <file path=ppt/slideLayouts/slideLayout8.xml><?xml version="1.0" encoding="utf-8"?>
-<p:sldLayout xmlns:a="http://schemas.openxmlformats.org/drawingml/2006/main" xmlns:r="http://schemas.openxmlformats.org/officeDocument/2006/relationships" xmlns:mc="http://schemas.openxmlformats.org/markup-compatibility/2006" xmlns:mv="urn:schemas-microsoft-com:mac:vml" xmlns:p="http://schemas.openxmlformats.org/presentationml/2006/main" mc:Ignorable="mv" mc:PreserveAttributes="mv:*" type="objTx" preserve="1">
+<p:sldLayout xmlns:a="http://schemas.openxmlformats.org/drawingml/2006/main" xmlns:r="http://schemas.openxmlformats.org/officeDocument/2006/relationships" xmlns:p="http://schemas.openxmlformats.org/presentationml/2006/main" type="objTx" preserve="1">
   <p:cSld name="Content with Caption">
     <p:spTree>
       <p:nvGrpSpPr>
@@ -3145,7 +3150,7 @@
             <a:fld id="{67D5CF40-C976-E240-A51E-7C97D6991720}" type="datetimeFigureOut">
               <a:rPr lang="en-US" smtClean="0"/>
               <a:pPr/>
-              <a:t>9/11/12</a:t>
+              <a:t>10/17/13</a:t>
             </a:fld>
             <a:endParaRPr lang="en-US"/>
           </a:p>
@@ -3188,7 +3193,7 @@
             <a:fld id="{5340D4B0-54F4-9B45-85A0-38D106B0B7D4}" type="slidenum">
               <a:rPr lang="en-US" smtClean="0"/>
               <a:pPr/>
-              <a:t>‹#›</a:t>
+              <a:t>‹nr.›</a:t>
             </a:fld>
             <a:endParaRPr lang="en-US"/>
           </a:p>
@@ -3203,7 +3208,7 @@
 </file>
 
 <file path=ppt/slideLayouts/slideLayout9.xml><?xml version="1.0" encoding="utf-8"?>
-<p:sldLayout xmlns:a="http://schemas.openxmlformats.org/drawingml/2006/main" xmlns:r="http://schemas.openxmlformats.org/officeDocument/2006/relationships" xmlns:mc="http://schemas.openxmlformats.org/markup-compatibility/2006" xmlns:mv="urn:schemas-microsoft-com:mac:vml" xmlns:p="http://schemas.openxmlformats.org/presentationml/2006/main" mc:Ignorable="mv" mc:PreserveAttributes="mv:*" type="picTx" preserve="1">
+<p:sldLayout xmlns:a="http://schemas.openxmlformats.org/drawingml/2006/main" xmlns:r="http://schemas.openxmlformats.org/officeDocument/2006/relationships" xmlns:p="http://schemas.openxmlformats.org/presentationml/2006/main" type="picTx" preserve="1">
   <p:cSld name="Picture with Caption">
     <p:spTree>
       <p:nvGrpSpPr>
@@ -3395,7 +3400,7 @@
             <a:fld id="{67D5CF40-C976-E240-A51E-7C97D6991720}" type="datetimeFigureOut">
               <a:rPr lang="en-US" smtClean="0"/>
               <a:pPr/>
-              <a:t>9/11/12</a:t>
+              <a:t>10/17/13</a:t>
             </a:fld>
             <a:endParaRPr lang="en-US"/>
           </a:p>
@@ -3438,7 +3443,7 @@
             <a:fld id="{5340D4B0-54F4-9B45-85A0-38D106B0B7D4}" type="slidenum">
               <a:rPr lang="en-US" smtClean="0"/>
               <a:pPr/>
-              <a:t>‹#›</a:t>
+              <a:t>‹nr.›</a:t>
             </a:fld>
             <a:endParaRPr lang="en-US"/>
           </a:p>
@@ -3453,7 +3458,7 @@
 </file>
 
 <file path=ppt/slideMasters/slideMaster1.xml><?xml version="1.0" encoding="utf-8"?>
-<p:sldMaster xmlns:a="http://schemas.openxmlformats.org/drawingml/2006/main" xmlns:r="http://schemas.openxmlformats.org/officeDocument/2006/relationships" xmlns:mc="http://schemas.openxmlformats.org/markup-compatibility/2006" xmlns:mv="urn:schemas-microsoft-com:mac:vml" xmlns:p="http://schemas.openxmlformats.org/presentationml/2006/main" mc:Ignorable="mv" mc:PreserveAttributes="mv:*">
+<p:sldMaster xmlns:a="http://schemas.openxmlformats.org/drawingml/2006/main" xmlns:r="http://schemas.openxmlformats.org/officeDocument/2006/relationships" xmlns:p="http://schemas.openxmlformats.org/presentationml/2006/main">
   <p:cSld>
     <p:bg>
       <p:bgRef idx="1001">
@@ -3605,7 +3610,7 @@
             <a:fld id="{67D5CF40-C976-E240-A51E-7C97D6991720}" type="datetimeFigureOut">
               <a:rPr lang="en-US" smtClean="0"/>
               <a:pPr/>
-              <a:t>9/11/12</a:t>
+              <a:t>10/17/13</a:t>
             </a:fld>
             <a:endParaRPr lang="en-US"/>
           </a:p>
@@ -3684,7 +3689,7 @@
             <a:fld id="{5340D4B0-54F4-9B45-85A0-38D106B0B7D4}" type="slidenum">
               <a:rPr lang="en-US" smtClean="0"/>
               <a:pPr/>
-              <a:t>‹#›</a:t>
+              <a:t>‹nr.›</a:t>
             </a:fld>
             <a:endParaRPr lang="en-US"/>
           </a:p>
@@ -3960,7 +3965,7 @@
 </file>
 
 <file path=ppt/slides/slide1.xml><?xml version="1.0" encoding="utf-8"?>
-<p:sld xmlns:a="http://schemas.openxmlformats.org/drawingml/2006/main" xmlns:r="http://schemas.openxmlformats.org/officeDocument/2006/relationships" xmlns:mc="http://schemas.openxmlformats.org/markup-compatibility/2006" xmlns:mv="urn:schemas-microsoft-com:mac:vml" xmlns:p="http://schemas.openxmlformats.org/presentationml/2006/main" mc:Ignorable="mv" mc:PreserveAttributes="mv:*">
+<p:sld xmlns:a="http://schemas.openxmlformats.org/drawingml/2006/main" xmlns:r="http://schemas.openxmlformats.org/officeDocument/2006/relationships" xmlns:p="http://schemas.openxmlformats.org/presentationml/2006/main">
   <p:cSld>
     <p:spTree>
       <p:nvGrpSpPr>
@@ -4068,7 +4073,7 @@
   <p:timing>
     <p:tnLst>
       <p:par>
-        <p:cTn id="1" dur="indefinite" restart="never" nodeType="tmRoot"/>
+        <p:cTn xmlns:p14="http://schemas.microsoft.com/office/powerpoint/2010/main" id="1" dur="indefinite" restart="never" nodeType="tmRoot"/>
       </p:par>
     </p:tnLst>
   </p:timing>
@@ -4076,7 +4081,7 @@
 </file>
 
 <file path=ppt/slides/slide10.xml><?xml version="1.0" encoding="utf-8"?>
-<p:sld xmlns:a="http://schemas.openxmlformats.org/drawingml/2006/main" xmlns:r="http://schemas.openxmlformats.org/officeDocument/2006/relationships" xmlns:mc="http://schemas.openxmlformats.org/markup-compatibility/2006" xmlns:mv="urn:schemas-microsoft-com:mac:vml" xmlns:p="http://schemas.openxmlformats.org/presentationml/2006/main" mc:Ignorable="mv" mc:PreserveAttributes="mv:*">
+<p:sld xmlns:a="http://schemas.openxmlformats.org/drawingml/2006/main" xmlns:r="http://schemas.openxmlformats.org/officeDocument/2006/relationships" xmlns:p="http://schemas.openxmlformats.org/presentationml/2006/main">
   <p:cSld>
     <p:spTree>
       <p:nvGrpSpPr>
@@ -4261,7 +4266,7 @@
   <p:timing>
     <p:tnLst>
       <p:par>
-        <p:cTn id="1" dur="indefinite" restart="never" nodeType="tmRoot"/>
+        <p:cTn xmlns:p14="http://schemas.microsoft.com/office/powerpoint/2010/main" id="1" dur="indefinite" restart="never" nodeType="tmRoot"/>
       </p:par>
     </p:tnLst>
   </p:timing>
@@ -4269,7 +4274,7 @@
 </file>
 
 <file path=ppt/slides/slide11.xml><?xml version="1.0" encoding="utf-8"?>
-<p:sld xmlns:a="http://schemas.openxmlformats.org/drawingml/2006/main" xmlns:r="http://schemas.openxmlformats.org/officeDocument/2006/relationships" xmlns:mc="http://schemas.openxmlformats.org/markup-compatibility/2006" xmlns:mv="urn:schemas-microsoft-com:mac:vml" xmlns:p="http://schemas.openxmlformats.org/presentationml/2006/main" mc:Ignorable="mv" mc:PreserveAttributes="mv:*">
+<p:sld xmlns:a="http://schemas.openxmlformats.org/drawingml/2006/main" xmlns:r="http://schemas.openxmlformats.org/officeDocument/2006/relationships" xmlns:p="http://schemas.openxmlformats.org/presentationml/2006/main">
   <p:cSld>
     <p:spTree>
       <p:nvGrpSpPr>
@@ -4438,7 +4443,7 @@
   <p:timing>
     <p:tnLst>
       <p:par>
-        <p:cTn id="1" dur="indefinite" restart="never" nodeType="tmRoot"/>
+        <p:cTn xmlns:p14="http://schemas.microsoft.com/office/powerpoint/2010/main" id="1" dur="indefinite" restart="never" nodeType="tmRoot"/>
       </p:par>
     </p:tnLst>
   </p:timing>
@@ -4446,7 +4451,7 @@
 </file>
 
 <file path=ppt/slides/slide12.xml><?xml version="1.0" encoding="utf-8"?>
-<p:sld xmlns:a="http://schemas.openxmlformats.org/drawingml/2006/main" xmlns:r="http://schemas.openxmlformats.org/officeDocument/2006/relationships" xmlns:mc="http://schemas.openxmlformats.org/markup-compatibility/2006" xmlns:mv="urn:schemas-microsoft-com:mac:vml" xmlns:p="http://schemas.openxmlformats.org/presentationml/2006/main" mc:Ignorable="mv" mc:PreserveAttributes="mv:*">
+<p:sld xmlns:a="http://schemas.openxmlformats.org/drawingml/2006/main" xmlns:r="http://schemas.openxmlformats.org/officeDocument/2006/relationships" xmlns:p="http://schemas.openxmlformats.org/presentationml/2006/main">
   <p:cSld>
     <p:spTree>
       <p:nvGrpSpPr>
@@ -4586,7 +4591,7 @@
   <p:timing>
     <p:tnLst>
       <p:par>
-        <p:cTn id="1" dur="indefinite" restart="never" nodeType="tmRoot"/>
+        <p:cTn xmlns:p14="http://schemas.microsoft.com/office/powerpoint/2010/main" id="1" dur="indefinite" restart="never" nodeType="tmRoot"/>
       </p:par>
     </p:tnLst>
   </p:timing>
@@ -4594,7 +4599,7 @@
 </file>
 
 <file path=ppt/slides/slide13.xml><?xml version="1.0" encoding="utf-8"?>
-<p:sld xmlns:a="http://schemas.openxmlformats.org/drawingml/2006/main" xmlns:r="http://schemas.openxmlformats.org/officeDocument/2006/relationships" xmlns:mc="http://schemas.openxmlformats.org/markup-compatibility/2006" xmlns:mv="urn:schemas-microsoft-com:mac:vml" xmlns:p="http://schemas.openxmlformats.org/presentationml/2006/main" mc:Ignorable="mv" mc:PreserveAttributes="mv:*">
+<p:sld xmlns:a="http://schemas.openxmlformats.org/drawingml/2006/main" xmlns:r="http://schemas.openxmlformats.org/officeDocument/2006/relationships" xmlns:p="http://schemas.openxmlformats.org/presentationml/2006/main">
   <p:cSld>
     <p:spTree>
       <p:nvGrpSpPr>
@@ -4718,18 +4723,11 @@
           <a:p>
             <a:r>
               <a:rPr lang="en-US" sz="2400" dirty="0" smtClean="0"/>
-              <a:t>RNA-</a:t>
-            </a:r>
-            <a:r>
-              <a:rPr lang="en-US" sz="2400" dirty="0" err="1" smtClean="0"/>
-              <a:t>seq</a:t>
-            </a:r>
-            <a:endParaRPr lang="en-US" sz="2400" dirty="0" smtClean="0"/>
-          </a:p>
-          <a:p>
+              <a:t>Methyl</a:t>
+            </a:r>
             <a:r>
               <a:rPr lang="en-US" sz="2400" dirty="0" smtClean="0"/>
-              <a:t>Methyl-</a:t>
+              <a:t>-</a:t>
             </a:r>
             <a:r>
               <a:rPr lang="en-US" sz="2400" dirty="0" err="1" smtClean="0"/>
@@ -4754,7 +4752,7 @@
   <p:timing>
     <p:tnLst>
       <p:par>
-        <p:cTn id="1" dur="indefinite" restart="never" nodeType="tmRoot"/>
+        <p:cTn xmlns:p14="http://schemas.microsoft.com/office/powerpoint/2010/main" id="1" dur="indefinite" restart="never" nodeType="tmRoot"/>
       </p:par>
     </p:tnLst>
   </p:timing>
@@ -4762,7 +4760,7 @@
 </file>
 
 <file path=ppt/slides/slide14.xml><?xml version="1.0" encoding="utf-8"?>
-<p:sld xmlns:a="http://schemas.openxmlformats.org/drawingml/2006/main" xmlns:r="http://schemas.openxmlformats.org/officeDocument/2006/relationships" xmlns:mc="http://schemas.openxmlformats.org/markup-compatibility/2006" xmlns:mv="urn:schemas-microsoft-com:mac:vml" xmlns:p="http://schemas.openxmlformats.org/presentationml/2006/main" mc:Ignorable="mv" mc:PreserveAttributes="mv:*">
+<p:sld xmlns:a="http://schemas.openxmlformats.org/drawingml/2006/main" xmlns:r="http://schemas.openxmlformats.org/officeDocument/2006/relationships" xmlns:p="http://schemas.openxmlformats.org/presentationml/2006/main">
   <p:cSld>
     <p:spTree>
       <p:nvGrpSpPr>
@@ -4850,7 +4848,7 @@
   <p:timing>
     <p:tnLst>
       <p:par>
-        <p:cTn id="1" dur="indefinite" restart="never" nodeType="tmRoot"/>
+        <p:cTn xmlns:p14="http://schemas.microsoft.com/office/powerpoint/2010/main" id="1" dur="indefinite" restart="never" nodeType="tmRoot"/>
       </p:par>
     </p:tnLst>
   </p:timing>
@@ -4858,7 +4856,7 @@
 </file>
 
 <file path=ppt/slides/slide15.xml><?xml version="1.0" encoding="utf-8"?>
-<p:sld xmlns:a="http://schemas.openxmlformats.org/drawingml/2006/main" xmlns:r="http://schemas.openxmlformats.org/officeDocument/2006/relationships" xmlns:mc="http://schemas.openxmlformats.org/markup-compatibility/2006" xmlns:mv="urn:schemas-microsoft-com:mac:vml" xmlns:p="http://schemas.openxmlformats.org/presentationml/2006/main" mc:Ignorable="mv" mc:PreserveAttributes="mv:*">
+<p:sld xmlns:a="http://schemas.openxmlformats.org/drawingml/2006/main" xmlns:r="http://schemas.openxmlformats.org/officeDocument/2006/relationships" xmlns:p="http://schemas.openxmlformats.org/presentationml/2006/main">
   <p:cSld>
     <p:spTree>
       <p:nvGrpSpPr>
@@ -5023,11 +5021,21 @@
           <a:p>
             <a:r>
               <a:rPr lang="en-US" sz="2054" dirty="0" smtClean="0"/>
-              <a:t>Installing NGS </a:t>
-            </a:r>
-            <a:r>
-              <a:rPr lang="en-US" sz="2054" dirty="0" err="1" smtClean="0"/>
-              <a:t>tool(kit)s</a:t>
+              <a:t>Installing NGS tool(kit)</a:t>
+            </a:r>
+            <a:r>
+              <a:rPr lang="en-US" sz="2054" dirty="0" smtClean="0"/>
+              <a:t>s</a:t>
+            </a:r>
+          </a:p>
+          <a:p>
+            <a:r>
+              <a:rPr lang="en-US" sz="2054" dirty="0"/>
+              <a:t>File validation and </a:t>
+            </a:r>
+            <a:r>
+              <a:rPr lang="en-US" sz="2054" dirty="0" smtClean="0"/>
+              <a:t>conversion</a:t>
             </a:r>
             <a:endParaRPr lang="en-US" sz="2054" dirty="0" smtClean="0"/>
           </a:p>
@@ -5046,14 +5054,28 @@
           <a:p>
             <a:r>
               <a:rPr lang="en-US" sz="2054" dirty="0" smtClean="0"/>
-              <a:t>File validation and conversion</a:t>
-            </a:r>
-          </a:p>
-          <a:p>
-            <a:r>
-              <a:rPr lang="en-US" sz="2054" smtClean="0"/>
-              <a:t>Your data?</a:t>
-            </a:r>
+              <a:t>Exploring the aligned genome</a:t>
+            </a:r>
+          </a:p>
+          <a:p>
+            <a:r>
+              <a:rPr lang="en-US" sz="2054" dirty="0" smtClean="0"/>
+              <a:t>Handling annotations</a:t>
+            </a:r>
+            <a:endParaRPr lang="en-US" sz="2054" dirty="0" smtClean="0"/>
+          </a:p>
+          <a:p>
+            <a:r>
+              <a:rPr lang="en-US" sz="2054" dirty="0" smtClean="0"/>
+              <a:t>Extracting loci by coordinates and names</a:t>
+            </a:r>
+          </a:p>
+          <a:p>
+            <a:r>
+              <a:rPr lang="en-US" sz="2054" dirty="0" smtClean="0"/>
+              <a:t>Building your own workflow tools</a:t>
+            </a:r>
+            <a:endParaRPr lang="en-US" sz="2054" dirty="0" smtClean="0"/>
           </a:p>
           <a:p>
             <a:endParaRPr lang="en-US" dirty="0" smtClean="0"/>
@@ -5074,7 +5096,7 @@
   <p:timing>
     <p:tnLst>
       <p:par>
-        <p:cTn id="1" dur="indefinite" restart="never" nodeType="tmRoot"/>
+        <p:cTn xmlns:p14="http://schemas.microsoft.com/office/powerpoint/2010/main" id="1" dur="indefinite" restart="never" nodeType="tmRoot"/>
       </p:par>
     </p:tnLst>
   </p:timing>
@@ -5082,7 +5104,7 @@
 </file>
 
 <file path=ppt/slides/slide16.xml><?xml version="1.0" encoding="utf-8"?>
-<p:sld xmlns:a="http://schemas.openxmlformats.org/drawingml/2006/main" xmlns:r="http://schemas.openxmlformats.org/officeDocument/2006/relationships" xmlns:mc="http://schemas.openxmlformats.org/markup-compatibility/2006" xmlns:mv="urn:schemas-microsoft-com:mac:vml" xmlns:p="http://schemas.openxmlformats.org/presentationml/2006/main" mc:Ignorable="mv" mc:PreserveAttributes="mv:*">
+<p:sld xmlns:a="http://schemas.openxmlformats.org/drawingml/2006/main" xmlns:r="http://schemas.openxmlformats.org/officeDocument/2006/relationships" xmlns:p="http://schemas.openxmlformats.org/presentationml/2006/main">
   <p:cSld>
     <p:spTree>
       <p:nvGrpSpPr>
@@ -5217,7 +5239,7 @@
                   <a:srgbClr val="0000FF"/>
                 </a:solidFill>
               </a:rPr>
-              <a:t>github.com/rvosa/ngs</a:t>
+              <a:t>github.com</a:t>
             </a:r>
             <a:r>
               <a:rPr lang="en-US" dirty="0" smtClean="0">
@@ -5225,7 +5247,31 @@
                   <a:srgbClr val="0000FF"/>
                 </a:solidFill>
               </a:rPr>
-              <a:t>-workflows</a:t>
+              <a:t>/</a:t>
+            </a:r>
+            <a:r>
+              <a:rPr lang="en-US" dirty="0" err="1" smtClean="0">
+                <a:solidFill>
+                  <a:srgbClr val="0000FF"/>
+                </a:solidFill>
+              </a:rPr>
+              <a:t>naturalis</a:t>
+            </a:r>
+            <a:r>
+              <a:rPr lang="en-US" dirty="0" smtClean="0">
+                <a:solidFill>
+                  <a:srgbClr val="0000FF"/>
+                </a:solidFill>
+              </a:rPr>
+              <a:t>/</a:t>
+            </a:r>
+            <a:r>
+              <a:rPr lang="en-US" smtClean="0">
+                <a:solidFill>
+                  <a:srgbClr val="0000FF"/>
+                </a:solidFill>
+              </a:rPr>
+              <a:t>arangs</a:t>
             </a:r>
             <a:endParaRPr lang="en-US" dirty="0">
               <a:solidFill>
@@ -5243,7 +5289,7 @@
   <p:timing>
     <p:tnLst>
       <p:par>
-        <p:cTn id="1" dur="indefinite" restart="never" nodeType="tmRoot"/>
+        <p:cTn xmlns:p14="http://schemas.microsoft.com/office/powerpoint/2010/main" id="1" dur="indefinite" restart="never" nodeType="tmRoot"/>
       </p:par>
     </p:tnLst>
   </p:timing>
@@ -5251,7 +5297,7 @@
 </file>
 
 <file path=ppt/slides/slide2.xml><?xml version="1.0" encoding="utf-8"?>
-<p:sld xmlns:a="http://schemas.openxmlformats.org/drawingml/2006/main" xmlns:r="http://schemas.openxmlformats.org/officeDocument/2006/relationships" xmlns:mc="http://schemas.openxmlformats.org/markup-compatibility/2006" xmlns:mv="urn:schemas-microsoft-com:mac:vml" xmlns:p="http://schemas.openxmlformats.org/presentationml/2006/main" mc:Ignorable="mv" mc:PreserveAttributes="mv:*">
+<p:sld xmlns:a="http://schemas.openxmlformats.org/drawingml/2006/main" xmlns:r="http://schemas.openxmlformats.org/officeDocument/2006/relationships" xmlns:p="http://schemas.openxmlformats.org/presentationml/2006/main">
   <p:cSld>
     <p:spTree>
       <p:nvGrpSpPr>
@@ -5474,7 +5520,7 @@
   <p:timing>
     <p:tnLst>
       <p:par>
-        <p:cTn id="1" dur="indefinite" restart="never" nodeType="tmRoot"/>
+        <p:cTn xmlns:p14="http://schemas.microsoft.com/office/powerpoint/2010/main" id="1" dur="indefinite" restart="never" nodeType="tmRoot"/>
       </p:par>
     </p:tnLst>
   </p:timing>
@@ -5482,7 +5528,7 @@
 </file>
 
 <file path=ppt/slides/slide3.xml><?xml version="1.0" encoding="utf-8"?>
-<p:sld xmlns:a="http://schemas.openxmlformats.org/drawingml/2006/main" xmlns:r="http://schemas.openxmlformats.org/officeDocument/2006/relationships" xmlns:mc="http://schemas.openxmlformats.org/markup-compatibility/2006" xmlns:mv="urn:schemas-microsoft-com:mac:vml" xmlns:p="http://schemas.openxmlformats.org/presentationml/2006/main" mc:Ignorable="mv" mc:PreserveAttributes="mv:*">
+<p:sld xmlns:a="http://schemas.openxmlformats.org/drawingml/2006/main" xmlns:r="http://schemas.openxmlformats.org/officeDocument/2006/relationships" xmlns:p="http://schemas.openxmlformats.org/presentationml/2006/main">
   <p:cSld>
     <p:spTree>
       <p:nvGrpSpPr>
@@ -5582,12 +5628,25 @@
             </a:r>
             <a:r>
               <a:rPr lang="en-US" sz="1400" dirty="0" err="1" smtClean="0"/>
-              <a:t>github.com/rvosa/ngs</a:t>
+              <a:t>github.com</a:t>
             </a:r>
             <a:r>
               <a:rPr lang="en-US" sz="1400" dirty="0" smtClean="0"/>
-              <a:t>-workflows</a:t>
-            </a:r>
+              <a:t>/</a:t>
+            </a:r>
+            <a:r>
+              <a:rPr lang="en-US" sz="1400" dirty="0" err="1" smtClean="0"/>
+              <a:t>naturalis</a:t>
+            </a:r>
+            <a:r>
+              <a:rPr lang="en-US" sz="1400" dirty="0" smtClean="0"/>
+              <a:t>/</a:t>
+            </a:r>
+            <a:r>
+              <a:rPr lang="en-US" sz="1400" dirty="0" err="1" smtClean="0"/>
+              <a:t>arangs</a:t>
+            </a:r>
+            <a:endParaRPr lang="en-US" sz="1400" dirty="0" smtClean="0"/>
           </a:p>
           <a:p>
             <a:r>
@@ -5651,7 +5710,7 @@
   <p:timing>
     <p:tnLst>
       <p:par>
-        <p:cTn id="1" dur="indefinite" restart="never" nodeType="tmRoot"/>
+        <p:cTn xmlns:p14="http://schemas.microsoft.com/office/powerpoint/2010/main" id="1" dur="indefinite" restart="never" nodeType="tmRoot"/>
       </p:par>
     </p:tnLst>
   </p:timing>
@@ -5659,7 +5718,7 @@
 </file>
 
 <file path=ppt/slides/slide4.xml><?xml version="1.0" encoding="utf-8"?>
-<p:sld xmlns:a="http://schemas.openxmlformats.org/drawingml/2006/main" xmlns:r="http://schemas.openxmlformats.org/officeDocument/2006/relationships" xmlns:mc="http://schemas.openxmlformats.org/markup-compatibility/2006" xmlns:mv="urn:schemas-microsoft-com:mac:vml" xmlns:p="http://schemas.openxmlformats.org/presentationml/2006/main" mc:Ignorable="mv" mc:PreserveAttributes="mv:*">
+<p:sld xmlns:a="http://schemas.openxmlformats.org/drawingml/2006/main" xmlns:r="http://schemas.openxmlformats.org/officeDocument/2006/relationships" xmlns:p="http://schemas.openxmlformats.org/presentationml/2006/main">
   <p:cSld>
     <p:spTree>
       <p:nvGrpSpPr>
@@ -5729,7 +5788,7 @@
   <p:timing>
     <p:tnLst>
       <p:par>
-        <p:cTn id="1" dur="indefinite" restart="never" nodeType="tmRoot"/>
+        <p:cTn xmlns:p14="http://schemas.microsoft.com/office/powerpoint/2010/main" id="1" dur="indefinite" restart="never" nodeType="tmRoot"/>
       </p:par>
     </p:tnLst>
   </p:timing>
@@ -5737,7 +5796,7 @@
 </file>
 
 <file path=ppt/slides/slide5.xml><?xml version="1.0" encoding="utf-8"?>
-<p:sld xmlns:a="http://schemas.openxmlformats.org/drawingml/2006/main" xmlns:r="http://schemas.openxmlformats.org/officeDocument/2006/relationships" xmlns:mc="http://schemas.openxmlformats.org/markup-compatibility/2006" xmlns:mv="urn:schemas-microsoft-com:mac:vml" xmlns:p="http://schemas.openxmlformats.org/presentationml/2006/main" mc:Ignorable="mv" mc:PreserveAttributes="mv:*">
+<p:sld xmlns:a="http://schemas.openxmlformats.org/drawingml/2006/main" xmlns:r="http://schemas.openxmlformats.org/officeDocument/2006/relationships" xmlns:p="http://schemas.openxmlformats.org/presentationml/2006/main">
   <p:cSld>
     <p:spTree>
       <p:nvGrpSpPr>
@@ -5864,7 +5923,7 @@
   <p:timing>
     <p:tnLst>
       <p:par>
-        <p:cTn id="1" dur="indefinite" restart="never" nodeType="tmRoot"/>
+        <p:cTn xmlns:p14="http://schemas.microsoft.com/office/powerpoint/2010/main" id="1" dur="indefinite" restart="never" nodeType="tmRoot"/>
       </p:par>
     </p:tnLst>
   </p:timing>
@@ -5872,7 +5931,7 @@
 </file>
 
 <file path=ppt/slides/slide6.xml><?xml version="1.0" encoding="utf-8"?>
-<p:sld xmlns:a="http://schemas.openxmlformats.org/drawingml/2006/main" xmlns:r="http://schemas.openxmlformats.org/officeDocument/2006/relationships" xmlns:mc="http://schemas.openxmlformats.org/markup-compatibility/2006" xmlns:mv="urn:schemas-microsoft-com:mac:vml" xmlns:p="http://schemas.openxmlformats.org/presentationml/2006/main" mc:Ignorable="mv" mc:PreserveAttributes="mv:*">
+<p:sld xmlns:a="http://schemas.openxmlformats.org/drawingml/2006/main" xmlns:r="http://schemas.openxmlformats.org/officeDocument/2006/relationships" xmlns:p="http://schemas.openxmlformats.org/presentationml/2006/main">
   <p:cSld>
     <p:spTree>
       <p:nvGrpSpPr>
@@ -6008,7 +6067,7 @@
   <p:timing>
     <p:tnLst>
       <p:par>
-        <p:cTn id="1" dur="indefinite" restart="never" nodeType="tmRoot"/>
+        <p:cTn xmlns:p14="http://schemas.microsoft.com/office/powerpoint/2010/main" id="1" dur="indefinite" restart="never" nodeType="tmRoot"/>
       </p:par>
     </p:tnLst>
   </p:timing>
@@ -6016,7 +6075,7 @@
 </file>
 
 <file path=ppt/slides/slide7.xml><?xml version="1.0" encoding="utf-8"?>
-<p:sld xmlns:a="http://schemas.openxmlformats.org/drawingml/2006/main" xmlns:r="http://schemas.openxmlformats.org/officeDocument/2006/relationships" xmlns:mc="http://schemas.openxmlformats.org/markup-compatibility/2006" xmlns:mv="urn:schemas-microsoft-com:mac:vml" xmlns:p="http://schemas.openxmlformats.org/presentationml/2006/main" mc:Ignorable="mv" mc:PreserveAttributes="mv:*">
+<p:sld xmlns:a="http://schemas.openxmlformats.org/drawingml/2006/main" xmlns:r="http://schemas.openxmlformats.org/officeDocument/2006/relationships" xmlns:p="http://schemas.openxmlformats.org/presentationml/2006/main">
   <p:cSld>
     <p:spTree>
       <p:nvGrpSpPr>
@@ -6178,7 +6237,7 @@
   <p:timing>
     <p:tnLst>
       <p:par>
-        <p:cTn id="1" dur="indefinite" restart="never" nodeType="tmRoot"/>
+        <p:cTn xmlns:p14="http://schemas.microsoft.com/office/powerpoint/2010/main" id="1" dur="indefinite" restart="never" nodeType="tmRoot"/>
       </p:par>
     </p:tnLst>
   </p:timing>
@@ -6186,7 +6245,7 @@
 </file>
 
 <file path=ppt/slides/slide8.xml><?xml version="1.0" encoding="utf-8"?>
-<p:sld xmlns:a="http://schemas.openxmlformats.org/drawingml/2006/main" xmlns:r="http://schemas.openxmlformats.org/officeDocument/2006/relationships" xmlns:mc="http://schemas.openxmlformats.org/markup-compatibility/2006" xmlns:mv="urn:schemas-microsoft-com:mac:vml" xmlns:p="http://schemas.openxmlformats.org/presentationml/2006/main" mc:Ignorable="mv" mc:PreserveAttributes="mv:*">
+<p:sld xmlns:a="http://schemas.openxmlformats.org/drawingml/2006/main" xmlns:r="http://schemas.openxmlformats.org/officeDocument/2006/relationships" xmlns:p="http://schemas.openxmlformats.org/presentationml/2006/main">
   <p:cSld>
     <p:spTree>
       <p:nvGrpSpPr>
@@ -6356,7 +6415,7 @@
   <p:timing>
     <p:tnLst>
       <p:par>
-        <p:cTn id="1" dur="indefinite" restart="never" nodeType="tmRoot"/>
+        <p:cTn xmlns:p14="http://schemas.microsoft.com/office/powerpoint/2010/main" id="1" dur="indefinite" restart="never" nodeType="tmRoot"/>
       </p:par>
     </p:tnLst>
   </p:timing>
@@ -6364,7 +6423,7 @@
 </file>
 
 <file path=ppt/slides/slide9.xml><?xml version="1.0" encoding="utf-8"?>
-<p:sld xmlns:a="http://schemas.openxmlformats.org/drawingml/2006/main" xmlns:r="http://schemas.openxmlformats.org/officeDocument/2006/relationships" xmlns:mc="http://schemas.openxmlformats.org/markup-compatibility/2006" xmlns:mv="urn:schemas-microsoft-com:mac:vml" xmlns:p="http://schemas.openxmlformats.org/presentationml/2006/main" mc:Ignorable="mv" mc:PreserveAttributes="mv:*">
+<p:sld xmlns:a="http://schemas.openxmlformats.org/drawingml/2006/main" xmlns:r="http://schemas.openxmlformats.org/officeDocument/2006/relationships" xmlns:p="http://schemas.openxmlformats.org/presentationml/2006/main">
   <p:cSld>
     <p:spTree>
       <p:nvGrpSpPr>
@@ -6524,7 +6583,7 @@
   <p:timing>
     <p:tnLst>
       <p:par>
-        <p:cTn id="1" dur="indefinite" restart="never" nodeType="tmRoot"/>
+        <p:cTn xmlns:p14="http://schemas.microsoft.com/office/powerpoint/2010/main" id="1" dur="indefinite" restart="never" nodeType="tmRoot"/>
       </p:par>
     </p:tnLst>
   </p:timing>

</xml_diff>